<commit_message>
#4 checking signin/-signup ERD
</commit_message>
<xml_diff>
--- a/docs/ERD.pptx
+++ b/docs/ERD.pptx
@@ -3632,8 +3632,8 @@
         </p:nvSpPr>
         <p:spPr>
           <a:xfrm>
-            <a:off x="3449682" y="436169"/>
-            <a:ext cx="5027595" cy="923330"/>
+            <a:off x="3229302" y="436169"/>
+            <a:ext cx="5468356" cy="923330"/>
           </a:xfrm>
           <a:prstGeom prst="rect">
             <a:avLst/>
@@ -3684,7 +3684,7 @@
                   </a:outerShdw>
                 </a:effectLst>
               </a:rPr>
-              <a:t>task_db</a:t>
+              <a:t>event_db</a:t>
             </a:r>
             <a:endParaRPr lang="en-US" sz="5400" b="0" cap="none" spc="0" dirty="0">
               <a:ln w="0"/>

</xml_diff>